<commit_message>
nop poster, hoan chinh bao cao
</commit_message>
<xml_diff>
--- a/thesis/ppt/poster.pptx
+++ b/thesis/ppt/poster.pptx
@@ -2480,11 +2480,7 @@
         <a:p>
           <a:r>
             <a:rPr lang="en-US" sz="2800" b="1" smtClean="0"/>
-            <a:t>Lý do </a:t>
-          </a:r>
-          <a:r>
-            <a:rPr lang="en-US" sz="2800" b="1" smtClean="0"/>
-            <a:t>phát triển ứng dụng</a:t>
+            <a:t>Lý do phát triển ứng dụng</a:t>
           </a:r>
           <a:endParaRPr lang="en-US" sz="2800" b="1"/>
         </a:p>
@@ -2525,7 +2521,7 @@
           </a:r>
           <a:r>
             <a:rPr lang="en-US" b="0" smtClean="0"/>
-            <a:t>Cung cấp nền tảng để người dùng tự ôn tập và chuẩn bị cho kỳ thi chứng chỉ CNTT cơ bản</a:t>
+            <a:t>cung cấp nền tảng để người dùng tự ôn tập và chuẩn bị cho kỳ thi chứng chỉ CNTT cơ bản</a:t>
           </a:r>
           <a:endParaRPr lang="en-US" b="0"/>
         </a:p>
@@ -2599,7 +2595,15 @@
           </a:r>
           <a:r>
             <a:rPr lang="vi-VN" smtClean="0"/>
-            <a:t>: Đơn giản hóa việc tiếp cận tài liệu, tiết kiệm thời gian và chi phí.</a:t>
+            <a:t>: </a:t>
+          </a:r>
+          <a:r>
+            <a:rPr lang="en-US" smtClean="0"/>
+            <a:t>đ</a:t>
+          </a:r>
+          <a:r>
+            <a:rPr lang="vi-VN" smtClean="0"/>
+            <a:t>ơn giản hóa việc tiếp cận tài liệu, tiết kiệm thời gian và chi phí.</a:t>
           </a:r>
           <a:endParaRPr lang="en-US"/>
         </a:p>
@@ -2827,7 +2831,7 @@
   <dgm:whole/>
   <dgm:extLst>
     <a:ext uri="http://schemas.microsoft.com/office/drawing/2008/diagram">
-      <dsp:dataModelExt xmlns:dsp="http://schemas.microsoft.com/office/drawing/2008/diagram" relId="rId10" minVer="http://schemas.openxmlformats.org/drawingml/2006/diagram"/>
+      <dsp:dataModelExt xmlns:dsp="http://schemas.microsoft.com/office/drawing/2008/diagram" relId="rId9" minVer="http://schemas.openxmlformats.org/drawingml/2006/diagram"/>
     </a:ext>
     <a:ext uri="{C62137D5-CB1D-491B-B009-E17868A290BF}">
       <dgm14:recolorImg xmlns:dgm14="http://schemas.microsoft.com/office/drawing/2010/diagram" val="1"/>
@@ -3470,9 +3474,9 @@
     <dgm:cxn modelId="{83B24A30-4034-4D3E-9523-9DAA026936AE}" type="presOf" srcId="{510C1C23-7383-444A-B4CE-327DD8C0B70D}" destId="{EDBF8727-6C09-450E-A5D7-FF1D9EA658EB}" srcOrd="0" destOrd="0" presId="urn:microsoft.com/office/officeart/2005/8/layout/hList1"/>
     <dgm:cxn modelId="{BEAE26A5-CDAD-4BE1-809C-2FB1C2187DD7}" type="presOf" srcId="{E332DED0-C90A-4BAB-8D3C-013509BF269D}" destId="{DFF43B05-A3B5-446F-B603-D1B74F896BB1}" srcOrd="0" destOrd="0" presId="urn:microsoft.com/office/officeart/2005/8/layout/hList1"/>
     <dgm:cxn modelId="{437ACA69-25E3-4E42-BDAC-557694B42215}" type="presOf" srcId="{A070700B-A921-47D1-8A46-C50C1E05AE0E}" destId="{8DC73E6F-E7A2-4687-920D-E82E4F78B8BE}" srcOrd="0" destOrd="0" presId="urn:microsoft.com/office/officeart/2005/8/layout/hList1"/>
+    <dgm:cxn modelId="{81BD15E5-B664-451F-BDA6-9D268381B675}" srcId="{0AA891BC-E0C1-48AD-A5D0-EEFE4C13F450}" destId="{C4E2F665-8086-4138-8647-D81154ECB754}" srcOrd="0" destOrd="0" parTransId="{A75EB4AF-2523-418C-A6ED-90EADA0568D4}" sibTransId="{02C4861A-17A5-43B7-97CC-746D7C53B6C7}"/>
+    <dgm:cxn modelId="{F03B83DF-FBB3-4ABE-9862-BE525838AACC}" srcId="{24B86867-37B9-4F82-BF27-0FA58758A904}" destId="{0AA891BC-E0C1-48AD-A5D0-EEFE4C13F450}" srcOrd="3" destOrd="0" parTransId="{5F3A3BF8-E55D-4E1D-9F51-DA99593347C2}" sibTransId="{3D992A77-D3A1-40BF-8F00-9EC55A528BD9}"/>
     <dgm:cxn modelId="{8B0EDE79-4C4C-4B45-A162-29F6000F8017}" srcId="{24B86867-37B9-4F82-BF27-0FA58758A904}" destId="{A070700B-A921-47D1-8A46-C50C1E05AE0E}" srcOrd="0" destOrd="0" parTransId="{E8D845D2-27F7-4B39-9E7A-8E821FEB25A6}" sibTransId="{51A40E95-38EB-4260-87C9-11909D103B23}"/>
-    <dgm:cxn modelId="{F03B83DF-FBB3-4ABE-9862-BE525838AACC}" srcId="{24B86867-37B9-4F82-BF27-0FA58758A904}" destId="{0AA891BC-E0C1-48AD-A5D0-EEFE4C13F450}" srcOrd="3" destOrd="0" parTransId="{5F3A3BF8-E55D-4E1D-9F51-DA99593347C2}" sibTransId="{3D992A77-D3A1-40BF-8F00-9EC55A528BD9}"/>
-    <dgm:cxn modelId="{81BD15E5-B664-451F-BDA6-9D268381B675}" srcId="{0AA891BC-E0C1-48AD-A5D0-EEFE4C13F450}" destId="{C4E2F665-8086-4138-8647-D81154ECB754}" srcOrd="0" destOrd="0" parTransId="{A75EB4AF-2523-418C-A6ED-90EADA0568D4}" sibTransId="{02C4861A-17A5-43B7-97CC-746D7C53B6C7}"/>
     <dgm:cxn modelId="{3D392575-0D6F-4F09-B8C0-FFC62A90CF5F}" srcId="{3695921B-BC89-45F1-91C1-B6D553768EAA}" destId="{37A1A658-0E6E-4899-B767-CCD75AA0D756}" srcOrd="1" destOrd="0" parTransId="{AF0E65BA-12ED-4358-89C5-70E083C8E6B0}" sibTransId="{71A09EA1-9D14-4FB1-B322-FCA679AA32E3}"/>
     <dgm:cxn modelId="{E65DCECA-652D-4FE2-AAC9-FC2384127307}" type="presOf" srcId="{F39542C0-4E05-450F-990E-5D12FF784DC2}" destId="{19ABDC58-D82A-409B-8369-732507F04136}" srcOrd="0" destOrd="0" presId="urn:microsoft.com/office/officeart/2005/8/layout/hList1"/>
     <dgm:cxn modelId="{3DFB43B9-DF15-452A-AE4B-62F188D8551E}" type="presParOf" srcId="{2DDD402A-4416-4E2B-9FD8-386BDCC5C8BF}" destId="{B15EFFA8-95DB-4530-A4A2-7DE564BCE6CB}" srcOrd="0" destOrd="0" presId="urn:microsoft.com/office/officeart/2005/8/layout/hList1"/>
@@ -3495,7 +3499,7 @@
   <dgm:whole/>
   <dgm:extLst>
     <a:ext uri="http://schemas.microsoft.com/office/drawing/2008/diagram">
-      <dsp:dataModelExt xmlns:dsp="http://schemas.microsoft.com/office/drawing/2008/diagram" relId="rId15" minVer="http://schemas.openxmlformats.org/drawingml/2006/diagram"/>
+      <dsp:dataModelExt xmlns:dsp="http://schemas.microsoft.com/office/drawing/2008/diagram" relId="rId14" minVer="http://schemas.openxmlformats.org/drawingml/2006/diagram"/>
     </a:ext>
   </dgm:extLst>
 </dgm:dataModel>
@@ -3522,7 +3526,23 @@
                 <a:schemeClr val="tx1"/>
               </a:solidFill>
             </a:rPr>
-            <a:t>Ôn tập linh hoạt: Mọi lúc, mọi nơi trên nền tảng Android.</a:t>
+            <a:t>Ôn tập linh hoạt: </a:t>
+          </a:r>
+          <a:r>
+            <a:rPr lang="en-US" smtClean="0">
+              <a:solidFill>
+                <a:schemeClr val="tx1"/>
+              </a:solidFill>
+            </a:rPr>
+            <a:t>m</a:t>
+          </a:r>
+          <a:r>
+            <a:rPr lang="vi-VN" smtClean="0">
+              <a:solidFill>
+                <a:schemeClr val="tx1"/>
+              </a:solidFill>
+            </a:rPr>
+            <a:t>ọi lúc, mọi nơi trên nền tảng Android.</a:t>
           </a:r>
           <a:endParaRPr lang="en-US">
             <a:solidFill>
@@ -3567,7 +3587,7 @@
                 <a:schemeClr val="tx1"/>
               </a:solidFill>
             </a:rPr>
-            <a:t>Tiết kiệm chi phí: Không cần mua tài liệu ôn thi riêng.</a:t>
+            <a:t>Tiết kiệm chi phí: không cần mua tài liệu ôn thi riêng.</a:t>
           </a:r>
           <a:endParaRPr lang="en-US">
             <a:solidFill>
@@ -3612,7 +3632,23 @@
                 <a:schemeClr val="tx1"/>
               </a:solidFill>
             </a:rPr>
-            <a:t>Tăng sự tự tin: Làm quen với cấu trúc bài thi, chuẩn bị kỹ lưỡng trước kỳ thi thật.</a:t>
+            <a:t>Tăng sự tự tin: </a:t>
+          </a:r>
+          <a:r>
+            <a:rPr lang="en-US" smtClean="0">
+              <a:solidFill>
+                <a:schemeClr val="tx1"/>
+              </a:solidFill>
+            </a:rPr>
+            <a:t>l</a:t>
+          </a:r>
+          <a:r>
+            <a:rPr lang="vi-VN" smtClean="0">
+              <a:solidFill>
+                <a:schemeClr val="tx1"/>
+              </a:solidFill>
+            </a:rPr>
+            <a:t>àm quen với cấu trúc bài thi, chuẩn bị kỹ lưỡng trước kỳ thi thật.</a:t>
           </a:r>
           <a:endParaRPr lang="en-US">
             <a:solidFill>
@@ -3661,6 +3697,13 @@
     <dgm:pt modelId="{BA79FA13-CA6C-428F-BCE4-DCAC93ADCBA6}" type="pres">
       <dgm:prSet presAssocID="{C437D7DF-A33D-476B-A2FE-9BF10C6D8D15}" presName="parentLeftMargin" presStyleLbl="node1" presStyleIdx="0" presStyleCnt="3"/>
       <dgm:spPr/>
+      <dgm:t>
+        <a:bodyPr/>
+        <a:lstStyle/>
+        <a:p>
+          <a:endParaRPr lang="en-US"/>
+        </a:p>
+      </dgm:t>
     </dgm:pt>
     <dgm:pt modelId="{80163524-887A-43D6-B0CE-89E71247C659}" type="pres">
       <dgm:prSet presAssocID="{C437D7DF-A33D-476B-A2FE-9BF10C6D8D15}" presName="parentText" presStyleLbl="node1" presStyleIdx="0" presStyleCnt="3">
@@ -3670,13 +3713,20 @@
         </dgm:presLayoutVars>
       </dgm:prSet>
       <dgm:spPr/>
+      <dgm:t>
+        <a:bodyPr/>
+        <a:lstStyle/>
+        <a:p>
+          <a:endParaRPr lang="en-US"/>
+        </a:p>
+      </dgm:t>
     </dgm:pt>
     <dgm:pt modelId="{B7DD97C1-EDE8-4A47-82DC-11870F5ABB14}" type="pres">
       <dgm:prSet presAssocID="{C437D7DF-A33D-476B-A2FE-9BF10C6D8D15}" presName="negativeSpace" presStyleCnt="0"/>
       <dgm:spPr/>
     </dgm:pt>
     <dgm:pt modelId="{89426C9E-EC1C-4D57-828E-BC43211C51CF}" type="pres">
-      <dgm:prSet presAssocID="{C437D7DF-A33D-476B-A2FE-9BF10C6D8D15}" presName="childText" presStyleLbl="conFgAcc1" presStyleIdx="0" presStyleCnt="3">
+      <dgm:prSet presAssocID="{C437D7DF-A33D-476B-A2FE-9BF10C6D8D15}" presName="childText" presStyleLbl="conFgAcc1" presStyleIdx="0" presStyleCnt="3" custScaleX="100000">
         <dgm:presLayoutVars>
           <dgm:bulletEnabled val="1"/>
         </dgm:presLayoutVars>
@@ -3694,22 +3744,36 @@
     <dgm:pt modelId="{34C27175-6A77-4123-8F8D-6A03A69080B5}" type="pres">
       <dgm:prSet presAssocID="{607BDD83-16A4-4307-BE19-CBE4E597333E}" presName="parentLeftMargin" presStyleLbl="node1" presStyleIdx="0" presStyleCnt="3"/>
       <dgm:spPr/>
+      <dgm:t>
+        <a:bodyPr/>
+        <a:lstStyle/>
+        <a:p>
+          <a:endParaRPr lang="en-US"/>
+        </a:p>
+      </dgm:t>
     </dgm:pt>
     <dgm:pt modelId="{B82FE106-D436-4180-8395-D80B9FD03F93}" type="pres">
-      <dgm:prSet presAssocID="{607BDD83-16A4-4307-BE19-CBE4E597333E}" presName="parentText" presStyleLbl="node1" presStyleIdx="1" presStyleCnt="3">
+      <dgm:prSet presAssocID="{607BDD83-16A4-4307-BE19-CBE4E597333E}" presName="parentText" presStyleLbl="node1" presStyleIdx="1" presStyleCnt="3" custScaleX="101062">
         <dgm:presLayoutVars>
           <dgm:chMax val="0"/>
           <dgm:bulletEnabled val="1"/>
         </dgm:presLayoutVars>
       </dgm:prSet>
       <dgm:spPr/>
+      <dgm:t>
+        <a:bodyPr/>
+        <a:lstStyle/>
+        <a:p>
+          <a:endParaRPr lang="en-US"/>
+        </a:p>
+      </dgm:t>
     </dgm:pt>
     <dgm:pt modelId="{526943CD-5C4F-4E99-A1F3-EAFF1DD3D15A}" type="pres">
       <dgm:prSet presAssocID="{607BDD83-16A4-4307-BE19-CBE4E597333E}" presName="negativeSpace" presStyleCnt="0"/>
       <dgm:spPr/>
     </dgm:pt>
     <dgm:pt modelId="{5F874A07-1ACC-4E80-8245-991222A66DFB}" type="pres">
-      <dgm:prSet presAssocID="{607BDD83-16A4-4307-BE19-CBE4E597333E}" presName="childText" presStyleLbl="conFgAcc1" presStyleIdx="1" presStyleCnt="3">
+      <dgm:prSet presAssocID="{607BDD83-16A4-4307-BE19-CBE4E597333E}" presName="childText" presStyleLbl="conFgAcc1" presStyleIdx="1" presStyleCnt="3" custScaleX="100000">
         <dgm:presLayoutVars>
           <dgm:bulletEnabled val="1"/>
         </dgm:presLayoutVars>
@@ -3727,6 +3791,13 @@
     <dgm:pt modelId="{B3656409-20E1-4B9D-A742-BFEDA9730A98}" type="pres">
       <dgm:prSet presAssocID="{4BC9ECE6-5CCA-4509-A0B3-CDDA3E46EEC4}" presName="parentLeftMargin" presStyleLbl="node1" presStyleIdx="1" presStyleCnt="3"/>
       <dgm:spPr/>
+      <dgm:t>
+        <a:bodyPr/>
+        <a:lstStyle/>
+        <a:p>
+          <a:endParaRPr lang="en-US"/>
+        </a:p>
+      </dgm:t>
     </dgm:pt>
     <dgm:pt modelId="{F24A8FD0-9BAB-401A-98B5-0EA30741A553}" type="pres">
       <dgm:prSet presAssocID="{4BC9ECE6-5CCA-4509-A0B3-CDDA3E46EEC4}" presName="parentText" presStyleLbl="node1" presStyleIdx="2" presStyleCnt="3">
@@ -3736,6 +3807,13 @@
         </dgm:presLayoutVars>
       </dgm:prSet>
       <dgm:spPr/>
+      <dgm:t>
+        <a:bodyPr/>
+        <a:lstStyle/>
+        <a:p>
+          <a:endParaRPr lang="en-US"/>
+        </a:p>
+      </dgm:t>
     </dgm:pt>
     <dgm:pt modelId="{9FE8E73E-5253-4345-BDF9-175DE57DC055}" type="pres">
       <dgm:prSet presAssocID="{4BC9ECE6-5CCA-4509-A0B3-CDDA3E46EEC4}" presName="negativeSpace" presStyleCnt="0"/>
@@ -3751,16 +3829,16 @@
     </dgm:pt>
   </dgm:ptLst>
   <dgm:cxnLst>
+    <dgm:cxn modelId="{25DBC8A4-71AE-4A07-BCF5-E7601194AC10}" type="presOf" srcId="{607BDD83-16A4-4307-BE19-CBE4E597333E}" destId="{34C27175-6A77-4123-8F8D-6A03A69080B5}" srcOrd="0" destOrd="0" presId="urn:microsoft.com/office/officeart/2005/8/layout/list1"/>
     <dgm:cxn modelId="{85EED2F2-5FB6-4B2A-B6EF-137F8959A1E4}" type="presOf" srcId="{607BDD83-16A4-4307-BE19-CBE4E597333E}" destId="{B82FE106-D436-4180-8395-D80B9FD03F93}" srcOrd="1" destOrd="0" presId="urn:microsoft.com/office/officeart/2005/8/layout/list1"/>
     <dgm:cxn modelId="{F3384BCE-8611-4182-9AD5-B8515D7938B9}" type="presOf" srcId="{DD4CC125-9467-490C-AAA8-CBF416179C45}" destId="{2E254932-8B3F-4AE0-B564-C9A0373986C1}" srcOrd="0" destOrd="0" presId="urn:microsoft.com/office/officeart/2005/8/layout/list1"/>
+    <dgm:cxn modelId="{EC81CC4B-BCEC-4538-8654-4B4216F2E412}" type="presOf" srcId="{C437D7DF-A33D-476B-A2FE-9BF10C6D8D15}" destId="{80163524-887A-43D6-B0CE-89E71247C659}" srcOrd="1" destOrd="0" presId="urn:microsoft.com/office/officeart/2005/8/layout/list1"/>
     <dgm:cxn modelId="{D6BF250D-269A-4081-B475-36EC4B0E576C}" srcId="{DD4CC125-9467-490C-AAA8-CBF416179C45}" destId="{C437D7DF-A33D-476B-A2FE-9BF10C6D8D15}" srcOrd="0" destOrd="0" parTransId="{2A523A29-90AE-400A-BBDC-FE19DF3EF819}" sibTransId="{7F704529-0949-4A9A-8504-12FB6BE73F19}"/>
+    <dgm:cxn modelId="{F61F50B2-7179-44DD-BB45-4A23C72BEA09}" srcId="{DD4CC125-9467-490C-AAA8-CBF416179C45}" destId="{4BC9ECE6-5CCA-4509-A0B3-CDDA3E46EEC4}" srcOrd="2" destOrd="0" parTransId="{C89D19E3-973F-48A3-8091-1D3ADDCE6238}" sibTransId="{C59930CA-4235-4C00-B58C-D4E6D83DD402}"/>
+    <dgm:cxn modelId="{C084BA1C-5C7D-4B40-AC6A-35EE4CD22504}" type="presOf" srcId="{4BC9ECE6-5CCA-4509-A0B3-CDDA3E46EEC4}" destId="{F24A8FD0-9BAB-401A-98B5-0EA30741A553}" srcOrd="1" destOrd="0" presId="urn:microsoft.com/office/officeart/2005/8/layout/list1"/>
     <dgm:cxn modelId="{7A5C1FE0-21FA-402E-9899-1D08C7F37646}" srcId="{DD4CC125-9467-490C-AAA8-CBF416179C45}" destId="{607BDD83-16A4-4307-BE19-CBE4E597333E}" srcOrd="1" destOrd="0" parTransId="{A38BF462-36D5-436D-8E0F-6A73D869F32A}" sibTransId="{50219BD6-CBD6-4B8D-8C5D-EDBC54B4FEB4}"/>
-    <dgm:cxn modelId="{F61F50B2-7179-44DD-BB45-4A23C72BEA09}" srcId="{DD4CC125-9467-490C-AAA8-CBF416179C45}" destId="{4BC9ECE6-5CCA-4509-A0B3-CDDA3E46EEC4}" srcOrd="2" destOrd="0" parTransId="{C89D19E3-973F-48A3-8091-1D3ADDCE6238}" sibTransId="{C59930CA-4235-4C00-B58C-D4E6D83DD402}"/>
     <dgm:cxn modelId="{CBCE74F6-A7E0-48D1-8F20-7CF0D6A7E0BA}" type="presOf" srcId="{4BC9ECE6-5CCA-4509-A0B3-CDDA3E46EEC4}" destId="{B3656409-20E1-4B9D-A742-BFEDA9730A98}" srcOrd="0" destOrd="0" presId="urn:microsoft.com/office/officeart/2005/8/layout/list1"/>
     <dgm:cxn modelId="{D2006F02-660A-473B-8528-1A3529E11775}" type="presOf" srcId="{C437D7DF-A33D-476B-A2FE-9BF10C6D8D15}" destId="{BA79FA13-CA6C-428F-BCE4-DCAC93ADCBA6}" srcOrd="0" destOrd="0" presId="urn:microsoft.com/office/officeart/2005/8/layout/list1"/>
-    <dgm:cxn modelId="{C084BA1C-5C7D-4B40-AC6A-35EE4CD22504}" type="presOf" srcId="{4BC9ECE6-5CCA-4509-A0B3-CDDA3E46EEC4}" destId="{F24A8FD0-9BAB-401A-98B5-0EA30741A553}" srcOrd="1" destOrd="0" presId="urn:microsoft.com/office/officeart/2005/8/layout/list1"/>
-    <dgm:cxn modelId="{EC81CC4B-BCEC-4538-8654-4B4216F2E412}" type="presOf" srcId="{C437D7DF-A33D-476B-A2FE-9BF10C6D8D15}" destId="{80163524-887A-43D6-B0CE-89E71247C659}" srcOrd="1" destOrd="0" presId="urn:microsoft.com/office/officeart/2005/8/layout/list1"/>
-    <dgm:cxn modelId="{25DBC8A4-71AE-4A07-BCF5-E7601194AC10}" type="presOf" srcId="{607BDD83-16A4-4307-BE19-CBE4E597333E}" destId="{34C27175-6A77-4123-8F8D-6A03A69080B5}" srcOrd="0" destOrd="0" presId="urn:microsoft.com/office/officeart/2005/8/layout/list1"/>
     <dgm:cxn modelId="{D4FE92A4-42B1-490C-A1CF-445BDA0A2DD1}" type="presParOf" srcId="{2E254932-8B3F-4AE0-B564-C9A0373986C1}" destId="{1B186212-8D33-462C-BFFD-C1116345A63A}" srcOrd="0" destOrd="0" presId="urn:microsoft.com/office/officeart/2005/8/layout/list1"/>
     <dgm:cxn modelId="{78C797DE-D789-4F97-9EDE-57DEF0CFEA87}" type="presParOf" srcId="{1B186212-8D33-462C-BFFD-C1116345A63A}" destId="{BA79FA13-CA6C-428F-BCE4-DCAC93ADCBA6}" srcOrd="0" destOrd="0" presId="urn:microsoft.com/office/officeart/2005/8/layout/list1"/>
     <dgm:cxn modelId="{8ED06966-B160-4A95-AD37-3C8D9BED1267}" type="presParOf" srcId="{1B186212-8D33-462C-BFFD-C1116345A63A}" destId="{80163524-887A-43D6-B0CE-89E71247C659}" srcOrd="1" destOrd="0" presId="urn:microsoft.com/office/officeart/2005/8/layout/list1"/>
@@ -3783,7 +3861,7 @@
   <dgm:whole/>
   <dgm:extLst>
     <a:ext uri="http://schemas.microsoft.com/office/drawing/2008/diagram">
-      <dsp:dataModelExt xmlns:dsp="http://schemas.microsoft.com/office/drawing/2008/diagram" relId="rId21" minVer="http://schemas.openxmlformats.org/drawingml/2006/diagram"/>
+      <dsp:dataModelExt xmlns:dsp="http://schemas.microsoft.com/office/drawing/2008/diagram" relId="rId20" minVer="http://schemas.openxmlformats.org/drawingml/2006/diagram"/>
     </a:ext>
   </dgm:extLst>
 </dgm:dataModel>
@@ -3847,11 +3925,7 @@
           </a:pPr>
           <a:r>
             <a:rPr lang="en-US" sz="2800" b="1" kern="1200" smtClean="0"/>
-            <a:t>Lý do </a:t>
-          </a:r>
-          <a:r>
-            <a:rPr lang="en-US" sz="2800" b="1" kern="1200" smtClean="0"/>
-            <a:t>phát triển ứng dụng</a:t>
+            <a:t>Lý do phát triển ứng dụng</a:t>
           </a:r>
           <a:endParaRPr lang="en-US" sz="2800" b="1" kern="1200"/>
         </a:p>
@@ -4302,7 +4376,7 @@
           </a:r>
           <a:r>
             <a:rPr lang="en-US" sz="1400" b="0" kern="1200" smtClean="0"/>
-            <a:t>Cung cấp nền tảng để người dùng tự ôn tập và chuẩn bị cho kỳ thi chứng chỉ CNTT cơ bản</a:t>
+            <a:t>cung cấp nền tảng để người dùng tự ôn tập và chuẩn bị cho kỳ thi chứng chỉ CNTT cơ bản</a:t>
           </a:r>
           <a:endParaRPr lang="en-US" sz="1400" b="0" kern="1200"/>
         </a:p>
@@ -4809,7 +4883,15 @@
           </a:r>
           <a:r>
             <a:rPr lang="vi-VN" sz="1400" kern="1200" smtClean="0"/>
-            <a:t>: Đơn giản hóa việc tiếp cận tài liệu, tiết kiệm thời gian và chi phí.</a:t>
+            <a:t>: </a:t>
+          </a:r>
+          <a:r>
+            <a:rPr lang="en-US" sz="1400" kern="1200" smtClean="0"/>
+            <a:t>đ</a:t>
+          </a:r>
+          <a:r>
+            <a:rPr lang="vi-VN" sz="1400" kern="1200" smtClean="0"/>
+            <a:t>ơn giản hóa việc tiếp cận tài liệu, tiết kiệm thời gian và chi phí.</a:t>
           </a:r>
           <a:endParaRPr lang="en-US" sz="1400" kern="1200"/>
         </a:p>
@@ -5677,7 +5759,23 @@
                 <a:schemeClr val="tx1"/>
               </a:solidFill>
             </a:rPr>
-            <a:t>Ôn tập linh hoạt: Mọi lúc, mọi nơi trên nền tảng Android.</a:t>
+            <a:t>Ôn tập linh hoạt: </a:t>
+          </a:r>
+          <a:r>
+            <a:rPr lang="en-US" sz="1600" kern="1200" smtClean="0">
+              <a:solidFill>
+                <a:schemeClr val="tx1"/>
+              </a:solidFill>
+            </a:rPr>
+            <a:t>m</a:t>
+          </a:r>
+          <a:r>
+            <a:rPr lang="vi-VN" sz="1600" kern="1200" smtClean="0">
+              <a:solidFill>
+                <a:schemeClr val="tx1"/>
+              </a:solidFill>
+            </a:rPr>
+            <a:t>ọi lúc, mọi nơi trên nền tảng Android.</a:t>
           </a:r>
           <a:endParaRPr lang="en-US" sz="1600" kern="1200">
             <a:solidFill>
@@ -5748,7 +5846,7 @@
       <dsp:spPr>
         <a:xfrm>
           <a:off x="298832" y="1739512"/>
-          <a:ext cx="4183656" cy="472320"/>
+          <a:ext cx="4228086" cy="472320"/>
         </a:xfrm>
         <a:prstGeom prst="roundRect">
           <a:avLst/>
@@ -5812,7 +5910,7 @@
                 <a:schemeClr val="tx1"/>
               </a:solidFill>
             </a:rPr>
-            <a:t>Tiết kiệm chi phí: Không cần mua tài liệu ôn thi riêng.</a:t>
+            <a:t>Tiết kiệm chi phí: không cần mua tài liệu ôn thi riêng.</a:t>
           </a:r>
           <a:endParaRPr lang="en-US" sz="1600" kern="1200">
             <a:solidFill>
@@ -5823,7 +5921,7 @@
       </dsp:txBody>
       <dsp:txXfrm>
         <a:off x="321889" y="1762569"/>
-        <a:ext cx="4137542" cy="426206"/>
+        <a:ext cx="4181972" cy="426206"/>
       </dsp:txXfrm>
     </dsp:sp>
     <dsp:sp modelId="{2140A9E9-C791-49F6-8359-36483C75DB3F}">
@@ -5947,7 +6045,23 @@
                 <a:schemeClr val="tx1"/>
               </a:solidFill>
             </a:rPr>
-            <a:t>Tăng sự tự tin: Làm quen với cấu trúc bài thi, chuẩn bị kỹ lưỡng trước kỳ thi thật.</a:t>
+            <a:t>Tăng sự tự tin: </a:t>
+          </a:r>
+          <a:r>
+            <a:rPr lang="en-US" sz="1600" kern="1200" smtClean="0">
+              <a:solidFill>
+                <a:schemeClr val="tx1"/>
+              </a:solidFill>
+            </a:rPr>
+            <a:t>l</a:t>
+          </a:r>
+          <a:r>
+            <a:rPr lang="vi-VN" sz="1600" kern="1200" smtClean="0">
+              <a:solidFill>
+                <a:schemeClr val="tx1"/>
+              </a:solidFill>
+            </a:rPr>
+            <a:t>àm quen với cấu trúc bài thi, chuẩn bị kỹ lưỡng trước kỳ thi thật.</a:t>
           </a:r>
           <a:endParaRPr lang="en-US" sz="1600" kern="1200">
             <a:solidFill>
@@ -10175,7 +10289,7 @@
           <a:p>
             <a:fld id="{1EC7AF36-123E-45CA-A0B4-875C307E3741}" type="datetimeFigureOut">
               <a:rPr lang="en-US" smtClean="0"/>
-              <a:t>12/29/2024</a:t>
+              <a:t>1/7/2025</a:t>
             </a:fld>
             <a:endParaRPr lang="en-US" dirty="0"/>
           </a:p>
@@ -10352,7 +10466,7 @@
           <a:p>
             <a:fld id="{5C5757AB-AE34-456A-9485-C3A4E8DB73FB}" type="datetimeFigureOut">
               <a:rPr lang="en-US" smtClean="0"/>
-              <a:t>12/29/2024</a:t>
+              <a:t>1/7/2025</a:t>
             </a:fld>
             <a:endParaRPr lang="en-US" dirty="0"/>
           </a:p>
@@ -11109,30 +11223,6 @@
           </a:p>
         </p:txBody>
       </p:sp>
-      <p:pic>
-        <p:nvPicPr>
-          <p:cNvPr id="207" name="Picture 206"/>
-          <p:cNvPicPr>
-            <a:picLocks noChangeAspect="1"/>
-          </p:cNvPicPr>
-          <p:nvPr/>
-        </p:nvPicPr>
-        <p:blipFill>
-          <a:blip r:embed="rId2"/>
-          <a:stretch>
-            <a:fillRect/>
-          </a:stretch>
-        </p:blipFill>
-        <p:spPr>
-          <a:xfrm>
-            <a:off x="253494" y="662382"/>
-            <a:ext cx="1345883" cy="1345883"/>
-          </a:xfrm>
-          <a:prstGeom prst="rect">
-            <a:avLst/>
-          </a:prstGeom>
-        </p:spPr>
-      </p:pic>
       <p:sp>
         <p:nvSpPr>
           <p:cNvPr id="208" name="TextBox 207"/>
@@ -11141,7 +11231,7 @@
         </p:nvSpPr>
         <p:spPr>
           <a:xfrm>
-            <a:off x="1788603" y="974581"/>
+            <a:off x="2108229" y="937087"/>
             <a:ext cx="9043487" cy="954107"/>
           </a:xfrm>
           <a:prstGeom prst="rect">
@@ -11192,13 +11282,13 @@
           <a:p>
             <a:r>
               <a:rPr lang="en-US" sz="1600" smtClean="0"/>
-              <a:t>Sinh viên thực hiện: Thượng Văn Anh Khoa</a:t>
+              <a:t>Sinh viên thực hiện:       Thượng Văn Anh Khoa</a:t>
             </a:r>
           </a:p>
           <a:p>
             <a:r>
               <a:rPr lang="en-US" sz="1600" smtClean="0"/>
-              <a:t>Giảng viên hướng dẫn: Ths.Nguyễn Hoàng Duy Thiện</a:t>
+              <a:t>Giảng viên hướng dẫn:  Nguyễn Hoàng Duy Thiện</a:t>
             </a:r>
             <a:endParaRPr lang="en-US" sz="1600"/>
           </a:p>
@@ -11282,7 +11372,7 @@
           <p:nvPr/>
         </p:nvPicPr>
         <p:blipFill>
-          <a:blip r:embed="rId3"/>
+          <a:blip r:embed="rId2"/>
           <a:stretch>
             <a:fillRect/>
           </a:stretch>
@@ -11337,7 +11427,7 @@
           <p:nvPr/>
         </p:nvPicPr>
         <p:blipFill>
-          <a:blip r:embed="rId4">
+          <a:blip r:embed="rId3">
             <a:extLst>
               <a:ext uri="{28A0092B-C50C-407E-A947-70E740481C1C}">
                 <a14:useLocalDpi xmlns:a14="http://schemas.microsoft.com/office/drawing/2010/main" val="0"/>
@@ -11409,7 +11499,7 @@
           <p:nvPr/>
         </p:nvPicPr>
         <p:blipFill>
-          <a:blip r:embed="rId5"/>
+          <a:blip r:embed="rId4"/>
           <a:stretch>
             <a:fillRect/>
           </a:stretch>
@@ -11462,18 +11552,18 @@
           <p:nvPr>
             <p:extLst>
               <p:ext uri="{D42A27DB-BD31-4B8C-83A1-F6EECF244321}">
-                <p14:modId xmlns:p14="http://schemas.microsoft.com/office/powerpoint/2010/main" val="3909823466"/>
+                <p14:modId xmlns:p14="http://schemas.microsoft.com/office/powerpoint/2010/main" val="3072664895"/>
               </p:ext>
             </p:extLst>
           </p:nvPr>
         </p:nvGraphicFramePr>
         <p:xfrm>
-          <a:off x="6995959" y="8591458"/>
+          <a:off x="6894286" y="8593761"/>
           <a:ext cx="4861468" cy="2469118"/>
         </p:xfrm>
         <a:graphic>
           <a:graphicData uri="http://schemas.openxmlformats.org/drawingml/2006/diagram">
-            <dgm:relIds xmlns:dgm="http://schemas.openxmlformats.org/drawingml/2006/diagram" xmlns:r="http://schemas.openxmlformats.org/officeDocument/2006/relationships" r:dm="rId6" r:lo="rId7" r:qs="rId8" r:cs="rId9"/>
+            <dgm:relIds xmlns:dgm="http://schemas.openxmlformats.org/drawingml/2006/diagram" xmlns:r="http://schemas.openxmlformats.org/officeDocument/2006/relationships" r:dm="rId5" r:lo="rId6" r:qs="rId7" r:cs="rId8"/>
           </a:graphicData>
         </a:graphic>
       </p:graphicFrame>
@@ -11484,18 +11574,18 @@
           <p:nvPr>
             <p:extLst>
               <p:ext uri="{D42A27DB-BD31-4B8C-83A1-F6EECF244321}">
-                <p14:modId xmlns:p14="http://schemas.microsoft.com/office/powerpoint/2010/main" val="3437214190"/>
+                <p14:modId xmlns:p14="http://schemas.microsoft.com/office/powerpoint/2010/main" val="3494882226"/>
               </p:ext>
             </p:extLst>
           </p:nvPr>
         </p:nvGraphicFramePr>
         <p:xfrm>
-          <a:off x="782380" y="5055157"/>
+          <a:off x="4767643" y="4886544"/>
           <a:ext cx="6891562" cy="4360586"/>
         </p:xfrm>
         <a:graphic>
           <a:graphicData uri="http://schemas.openxmlformats.org/drawingml/2006/diagram">
-            <dgm:relIds xmlns:dgm="http://schemas.openxmlformats.org/drawingml/2006/diagram" xmlns:r="http://schemas.openxmlformats.org/officeDocument/2006/relationships" r:dm="rId11" r:lo="rId12" r:qs="rId13" r:cs="rId14"/>
+            <dgm:relIds xmlns:dgm="http://schemas.openxmlformats.org/drawingml/2006/diagram" xmlns:r="http://schemas.openxmlformats.org/officeDocument/2006/relationships" r:dm="rId10" r:lo="rId11" r:qs="rId12" r:cs="rId13"/>
           </a:graphicData>
         </a:graphic>
       </p:graphicFrame>
@@ -11507,7 +11597,7 @@
         </p:nvSpPr>
         <p:spPr>
           <a:xfrm>
-            <a:off x="2211435" y="5578701"/>
+            <a:off x="6341452" y="5450866"/>
             <a:ext cx="3901440" cy="523220"/>
           </a:xfrm>
           <a:prstGeom prst="rect">
@@ -11568,7 +11658,7 @@
           <p:nvPr/>
         </p:nvPicPr>
         <p:blipFill>
-          <a:blip r:embed="rId16">
+          <a:blip r:embed="rId15">
             <a:extLst>
               <a:ext uri="{28A0092B-C50C-407E-A947-70E740481C1C}">
                 <a14:useLocalDpi xmlns:a14="http://schemas.microsoft.com/office/drawing/2010/main" val="0"/>
@@ -11638,7 +11728,7 @@
           <p:nvPr>
             <p:extLst>
               <p:ext uri="{D42A27DB-BD31-4B8C-83A1-F6EECF244321}">
-                <p14:modId xmlns:p14="http://schemas.microsoft.com/office/powerpoint/2010/main" val="2289554759"/>
+                <p14:modId xmlns:p14="http://schemas.microsoft.com/office/powerpoint/2010/main" val="1535204772"/>
               </p:ext>
             </p:extLst>
           </p:nvPr>
@@ -11649,7 +11739,7 @@
         </p:xfrm>
         <a:graphic>
           <a:graphicData uri="http://schemas.openxmlformats.org/drawingml/2006/diagram">
-            <dgm:relIds xmlns:dgm="http://schemas.openxmlformats.org/drawingml/2006/diagram" xmlns:r="http://schemas.openxmlformats.org/officeDocument/2006/relationships" r:dm="rId17" r:lo="rId18" r:qs="rId19" r:cs="rId20"/>
+            <dgm:relIds xmlns:dgm="http://schemas.openxmlformats.org/drawingml/2006/diagram" xmlns:r="http://schemas.openxmlformats.org/officeDocument/2006/relationships" r:dm="rId16" r:lo="rId17" r:qs="rId18" r:cs="rId19"/>
           </a:graphicData>
         </a:graphic>
       </p:graphicFrame>
@@ -11691,7 +11781,7 @@
         </p:nvSpPr>
         <p:spPr>
           <a:xfrm>
-            <a:off x="782380" y="11742057"/>
+            <a:off x="947190" y="11467034"/>
             <a:ext cx="3949277" cy="461665"/>
           </a:xfrm>
           <a:prstGeom prst="rect">
@@ -11726,7 +11816,7 @@
           <p:nvPr/>
         </p:nvPicPr>
         <p:blipFill>
-          <a:blip r:embed="rId22">
+          <a:blip r:embed="rId21">
             <a:extLst>
               <a:ext uri="{28A0092B-C50C-407E-A947-70E740481C1C}">
                 <a14:useLocalDpi xmlns:a14="http://schemas.microsoft.com/office/drawing/2010/main" val="0"/>
@@ -11739,7 +11829,7 @@
         </p:blipFill>
         <p:spPr>
           <a:xfrm>
-            <a:off x="10061725" y="11486271"/>
+            <a:off x="1893972" y="6040581"/>
             <a:ext cx="1334499" cy="1334499"/>
           </a:xfrm>
           <a:prstGeom prst="rect">
@@ -11755,7 +11845,7 @@
         </p:nvSpPr>
         <p:spPr>
           <a:xfrm>
-            <a:off x="9489749" y="12879983"/>
+            <a:off x="1321995" y="7433514"/>
             <a:ext cx="2478452" cy="383936"/>
           </a:xfrm>
           <a:prstGeom prst="rect">
@@ -11787,14 +11877,14 @@
           <p:nvPr/>
         </p:nvPicPr>
         <p:blipFill>
-          <a:blip r:embed="rId23"/>
+          <a:blip r:embed="rId22"/>
           <a:stretch>
             <a:fillRect/>
           </a:stretch>
         </p:blipFill>
         <p:spPr>
           <a:xfrm>
-            <a:off x="1247505" y="12203722"/>
+            <a:off x="1303850" y="11928699"/>
             <a:ext cx="1202160" cy="2754949"/>
           </a:xfrm>
           <a:prstGeom prst="rect">
@@ -11810,7 +11900,7 @@
         </p:nvSpPr>
         <p:spPr>
           <a:xfrm>
-            <a:off x="542870" y="15024114"/>
+            <a:off x="599215" y="14749091"/>
             <a:ext cx="2689426" cy="307777"/>
           </a:xfrm>
           <a:prstGeom prst="rect">
@@ -11842,14 +11932,14 @@
           <p:nvPr/>
         </p:nvPicPr>
         <p:blipFill>
-          <a:blip r:embed="rId24"/>
+          <a:blip r:embed="rId23"/>
           <a:stretch>
             <a:fillRect/>
           </a:stretch>
         </p:blipFill>
         <p:spPr>
           <a:xfrm>
-            <a:off x="3558941" y="12203722"/>
+            <a:off x="3615286" y="11928699"/>
             <a:ext cx="1206427" cy="2764729"/>
           </a:xfrm>
           <a:prstGeom prst="rect">
@@ -11865,7 +11955,7 @@
         </p:nvSpPr>
         <p:spPr>
           <a:xfrm>
-            <a:off x="2872418" y="15026885"/>
+            <a:off x="2928763" y="14751862"/>
             <a:ext cx="2689426" cy="307777"/>
           </a:xfrm>
           <a:prstGeom prst="rect">
@@ -11888,30 +11978,6 @@
           </a:p>
         </p:txBody>
       </p:sp>
-      <p:pic>
-        <p:nvPicPr>
-          <p:cNvPr id="10" name="Picture 9"/>
-          <p:cNvPicPr>
-            <a:picLocks noChangeAspect="1"/>
-          </p:cNvPicPr>
-          <p:nvPr/>
-        </p:nvPicPr>
-        <p:blipFill>
-          <a:blip r:embed="rId25"/>
-          <a:stretch>
-            <a:fillRect/>
-          </a:stretch>
-        </p:blipFill>
-        <p:spPr>
-          <a:xfrm>
-            <a:off x="5793799" y="12203722"/>
-            <a:ext cx="1202160" cy="2754949"/>
-          </a:xfrm>
-          <a:prstGeom prst="rect">
-            <a:avLst/>
-          </a:prstGeom>
-        </p:spPr>
-      </p:pic>
       <p:sp>
         <p:nvSpPr>
           <p:cNvPr id="30" name="TextBox 29"/>
@@ -11920,7 +11986,7 @@
         </p:nvSpPr>
         <p:spPr>
           <a:xfrm>
-            <a:off x="5055796" y="15024115"/>
+            <a:off x="5112141" y="14749092"/>
             <a:ext cx="2689426" cy="307777"/>
           </a:xfrm>
           <a:prstGeom prst="rect">
@@ -11951,7 +12017,7 @@
         </p:nvSpPr>
         <p:spPr>
           <a:xfrm>
-            <a:off x="7075600" y="15024115"/>
+            <a:off x="7131945" y="14749092"/>
             <a:ext cx="2689426" cy="307777"/>
           </a:xfrm>
           <a:prstGeom prst="rect">
@@ -11983,15 +12049,15 @@
           <p:nvPr/>
         </p:nvPicPr>
         <p:blipFill>
-          <a:blip r:embed="rId26"/>
+          <a:blip r:embed="rId24"/>
           <a:stretch>
             <a:fillRect/>
           </a:stretch>
         </p:blipFill>
         <p:spPr>
           <a:xfrm>
-            <a:off x="7835731" y="12252711"/>
-            <a:ext cx="1180782" cy="2705960"/>
+            <a:off x="7870699" y="11928699"/>
+            <a:ext cx="1202159" cy="2754949"/>
           </a:xfrm>
           <a:prstGeom prst="rect">
             <a:avLst/>
@@ -12006,7 +12072,7 @@
         </p:nvSpPr>
         <p:spPr>
           <a:xfrm>
-            <a:off x="7613933" y="11427058"/>
+            <a:off x="919265" y="5467611"/>
             <a:ext cx="3542102" cy="400110"/>
           </a:xfrm>
           <a:prstGeom prst="rect">
@@ -12030,14 +12096,44 @@
       </p:sp>
       <p:pic>
         <p:nvPicPr>
-          <p:cNvPr id="1026" name="Picture 2" descr="https://cf-sparkai-live.s3.amazonaws.com/users/2qsnXvdWCaNX2AwFrUzixgjbJZ7/spark_ai/o_bg-remover-gen_2qsnZngZkzp0MXeqsN3akk8ROYS.png"/>
+          <p:cNvPr id="20" name="Picture 19"/>
+          <p:cNvPicPr>
+            <a:picLocks noChangeAspect="1"/>
+          </p:cNvPicPr>
+          <p:nvPr/>
+        </p:nvPicPr>
+        <p:blipFill>
+          <a:blip r:embed="rId25">
+            <a:extLst>
+              <a:ext uri="{28A0092B-C50C-407E-A947-70E740481C1C}">
+                <a14:useLocalDpi xmlns:a14="http://schemas.microsoft.com/office/drawing/2010/main" val="0"/>
+              </a:ext>
+            </a:extLst>
+          </a:blip>
+          <a:stretch>
+            <a:fillRect/>
+          </a:stretch>
+        </p:blipFill>
+        <p:spPr>
+          <a:xfrm>
+            <a:off x="307975" y="403682"/>
+            <a:ext cx="1714919" cy="1714919"/>
+          </a:xfrm>
+          <a:prstGeom prst="rect">
+            <a:avLst/>
+          </a:prstGeom>
+        </p:spPr>
+      </p:pic>
+      <p:pic>
+        <p:nvPicPr>
+          <p:cNvPr id="37" name="Picture 2" descr="https://cf-sparkai-live.s3.amazonaws.com/users/2qsnXvdWCaNX2AwFrUzixgjbJZ7/spark_ai/o_bg-remover-gen_2qsnZngZkzp0MXeqsN3akk8ROYS.png"/>
           <p:cNvPicPr>
             <a:picLocks noChangeAspect="1" noChangeArrowheads="1"/>
           </p:cNvPicPr>
           <p:nvPr/>
         </p:nvPicPr>
         <p:blipFill>
-          <a:blip r:embed="rId27">
+          <a:blip r:embed="rId26">
             <a:extLst>
               <a:ext uri="{28A0092B-C50C-407E-A947-70E740481C1C}">
                 <a14:useLocalDpi xmlns:a14="http://schemas.microsoft.com/office/drawing/2010/main" val="0"/>
@@ -12051,8 +12147,8 @@
         </p:blipFill>
         <p:spPr bwMode="auto">
           <a:xfrm>
-            <a:off x="7461187" y="4801402"/>
-            <a:ext cx="5088886" cy="2940246"/>
+            <a:off x="9751988" y="4217009"/>
+            <a:ext cx="2390325" cy="1381077"/>
           </a:xfrm>
           <a:prstGeom prst="rect">
             <a:avLst/>
@@ -12069,6 +12165,149 @@
           </a:extLst>
         </p:spPr>
       </p:pic>
+      <p:pic>
+        <p:nvPicPr>
+          <p:cNvPr id="38" name="Picture 1"/>
+          <p:cNvPicPr>
+            <a:picLocks noChangeAspect="1" noChangeArrowheads="1"/>
+          </p:cNvPicPr>
+          <p:nvPr/>
+        </p:nvPicPr>
+        <p:blipFill>
+          <a:blip r:embed="rId27" cstate="print">
+            <a:extLst>
+              <a:ext uri="{28A0092B-C50C-407E-A947-70E740481C1C}">
+                <a14:useLocalDpi xmlns:a14="http://schemas.microsoft.com/office/drawing/2010/main" val="0"/>
+              </a:ext>
+            </a:extLst>
+          </a:blip>
+          <a:srcRect/>
+          <a:stretch>
+            <a:fillRect/>
+          </a:stretch>
+        </p:blipFill>
+        <p:spPr bwMode="auto">
+          <a:xfrm>
+            <a:off x="5783029" y="11857443"/>
+            <a:ext cx="1285353" cy="2835985"/>
+          </a:xfrm>
+          <a:prstGeom prst="rect">
+            <a:avLst/>
+          </a:prstGeom>
+          <a:noFill/>
+          <a:ln>
+            <a:noFill/>
+          </a:ln>
+          <a:extLst>
+            <a:ext uri="{909E8E84-426E-40DD-AFC4-6F175D3DCCD1}">
+              <a14:hiddenFill xmlns:a14="http://schemas.microsoft.com/office/drawing/2010/main">
+                <a:solidFill>
+                  <a:srgbClr val="FFFFFF"/>
+                </a:solidFill>
+              </a14:hiddenFill>
+            </a:ext>
+            <a:ext uri="{91240B29-F687-4F45-9708-019B960494DF}">
+              <a14:hiddenLine xmlns:a14="http://schemas.microsoft.com/office/drawing/2010/main" w="9525">
+                <a:solidFill>
+                  <a:srgbClr val="000000"/>
+                </a:solidFill>
+                <a:miter lim="800000"/>
+                <a:headEnd/>
+                <a:tailEnd/>
+              </a14:hiddenLine>
+            </a:ext>
+          </a:extLst>
+        </p:spPr>
+      </p:pic>
+      <p:pic>
+        <p:nvPicPr>
+          <p:cNvPr id="39" name="Picture 4"/>
+          <p:cNvPicPr>
+            <a:picLocks noChangeAspect="1" noChangeArrowheads="1"/>
+          </p:cNvPicPr>
+          <p:nvPr/>
+        </p:nvPicPr>
+        <p:blipFill>
+          <a:blip r:embed="rId28" cstate="print">
+            <a:extLst>
+              <a:ext uri="{28A0092B-C50C-407E-A947-70E740481C1C}">
+                <a14:useLocalDpi xmlns:a14="http://schemas.microsoft.com/office/drawing/2010/main" val="0"/>
+              </a:ext>
+            </a:extLst>
+          </a:blip>
+          <a:srcRect/>
+          <a:stretch>
+            <a:fillRect/>
+          </a:stretch>
+        </p:blipFill>
+        <p:spPr bwMode="auto">
+          <a:xfrm>
+            <a:off x="9800915" y="11928699"/>
+            <a:ext cx="1327003" cy="2754949"/>
+          </a:xfrm>
+          <a:prstGeom prst="rect">
+            <a:avLst/>
+          </a:prstGeom>
+          <a:noFill/>
+          <a:ln>
+            <a:noFill/>
+          </a:ln>
+          <a:extLst>
+            <a:ext uri="{909E8E84-426E-40DD-AFC4-6F175D3DCCD1}">
+              <a14:hiddenFill xmlns:a14="http://schemas.microsoft.com/office/drawing/2010/main">
+                <a:solidFill>
+                  <a:srgbClr val="FFFFFF"/>
+                </a:solidFill>
+              </a14:hiddenFill>
+            </a:ext>
+            <a:ext uri="{91240B29-F687-4F45-9708-019B960494DF}">
+              <a14:hiddenLine xmlns:a14="http://schemas.microsoft.com/office/drawing/2010/main" w="9525">
+                <a:solidFill>
+                  <a:srgbClr val="000000"/>
+                </a:solidFill>
+                <a:miter lim="800000"/>
+                <a:headEnd/>
+                <a:tailEnd/>
+              </a14:hiddenLine>
+            </a:ext>
+          </a:extLst>
+        </p:spPr>
+      </p:pic>
+      <p:sp>
+        <p:nvSpPr>
+          <p:cNvPr id="40" name="TextBox 39"/>
+          <p:cNvSpPr txBox="1"/>
+          <p:nvPr/>
+        </p:nvSpPr>
+        <p:spPr>
+          <a:xfrm>
+            <a:off x="9119703" y="14735889"/>
+            <a:ext cx="2689426" cy="307777"/>
+          </a:xfrm>
+          <a:prstGeom prst="rect">
+            <a:avLst/>
+          </a:prstGeom>
+          <a:noFill/>
+        </p:spPr>
+        <p:txBody>
+          <a:bodyPr wrap="square" rtlCol="0">
+            <a:spAutoFit/>
+          </a:bodyPr>
+          <a:lstStyle/>
+          <a:p>
+            <a:pPr algn="ctr"/>
+            <a:r>
+              <a:rPr lang="en-US" sz="1400" b="1" smtClean="0"/>
+              <a:t>Giao diện </a:t>
+            </a:r>
+            <a:r>
+              <a:rPr lang="en-US" sz="1400" b="1" smtClean="0"/>
+              <a:t>menu</a:t>
+            </a:r>
+            <a:endParaRPr lang="en-US" sz="1400" b="1"/>
+          </a:p>
+        </p:txBody>
+      </p:sp>
     </p:spTree>
     <p:extLst>
       <p:ext uri="{BB962C8B-B14F-4D97-AF65-F5344CB8AC3E}">
@@ -12924,6 +13163,23 @@
 </file>
 
 <file path=customXml/item1.xml><?xml version="1.0" encoding="utf-8"?>
+<p:properties xmlns:p="http://schemas.microsoft.com/office/2006/metadata/properties" xmlns:xsi="http://www.w3.org/2001/XMLSchema-instance" xmlns:pc="http://schemas.microsoft.com/office/infopath/2007/PartnerControls">
+  <documentManagement>
+    <MediaServiceKeyPoints xmlns="71af3243-3dd4-4a8d-8c0d-dd76da1f02a5" xsi:nil="true"/>
+  </documentManagement>
+</p:properties>
+</file>
+
+<file path=customXml/item2.xml><?xml version="1.0" encoding="utf-8"?>
+<?mso-contentType ?>
+<FormTemplates xmlns="http://schemas.microsoft.com/sharepoint/v3/contenttype/forms">
+  <Display>DocumentLibraryForm</Display>
+  <Edit>DocumentLibraryForm</Edit>
+  <New>DocumentLibraryForm</New>
+</FormTemplates>
+</file>
+
+<file path=customXml/item3.xml><?xml version="1.0" encoding="utf-8"?>
 <ct:contentTypeSchema xmlns:ct="http://schemas.microsoft.com/office/2006/metadata/contentType" xmlns:ma="http://schemas.microsoft.com/office/2006/metadata/properties/metaAttributes" ct:_="" ma:_="" ma:contentTypeName="Document" ma:contentTypeID="0x01010079F111ED35F8CC479449609E8A0923A6" ma:contentTypeVersion="11" ma:contentTypeDescription="Create a new document." ma:contentTypeScope="" ma:versionID="96291512c1ee715ab617f4c07df79fc1">
   <xsd:schema xmlns:xsd="http://www.w3.org/2001/XMLSchema" xmlns:xs="http://www.w3.org/2001/XMLSchema" xmlns:p="http://schemas.microsoft.com/office/2006/metadata/properties" xmlns:ns2="71af3243-3dd4-4a8d-8c0d-dd76da1f02a5" xmlns:ns3="16c05727-aa75-4e4a-9b5f-8a80a1165891" targetNamespace="http://schemas.microsoft.com/office/2006/metadata/properties" ma:root="true" ma:fieldsID="8256c27c40ca5c40ce1cf6c44f0205df" ns2:_="" ns3:_="">
     <xsd:import namespace="71af3243-3dd4-4a8d-8c0d-dd76da1f02a5"/>
@@ -13134,24 +13390,32 @@
 </ct:contentTypeSchema>
 </file>
 
-<file path=customXml/item2.xml><?xml version="1.0" encoding="utf-8"?>
-<?mso-contentType ?>
-<FormTemplates xmlns="http://schemas.microsoft.com/sharepoint/v3/contenttype/forms">
-  <Display>DocumentLibraryForm</Display>
-  <Edit>DocumentLibraryForm</Edit>
-  <New>DocumentLibraryForm</New>
-</FormTemplates>
+<file path=customXml/itemProps1.xml><?xml version="1.0" encoding="utf-8"?>
+<ds:datastoreItem xmlns:ds="http://schemas.openxmlformats.org/officeDocument/2006/customXml" ds:itemID="{1F7A24C6-F6F8-404A-BEA9-F5AB5CC4EFF3}">
+  <ds:schemaRefs>
+    <ds:schemaRef ds:uri="http://schemas.microsoft.com/office/2006/documentManagement/types"/>
+    <ds:schemaRef ds:uri="http://www.w3.org/XML/1998/namespace"/>
+    <ds:schemaRef ds:uri="http://purl.org/dc/dcmitype/"/>
+    <ds:schemaRef ds:uri="http://purl.org/dc/terms/"/>
+    <ds:schemaRef ds:uri="http://schemas.microsoft.com/office/infopath/2007/PartnerControls"/>
+    <ds:schemaRef ds:uri="http://schemas.microsoft.com/office/2006/metadata/properties"/>
+    <ds:schemaRef ds:uri="http://purl.org/dc/elements/1.1/"/>
+    <ds:schemaRef ds:uri="http://schemas.openxmlformats.org/package/2006/metadata/core-properties"/>
+    <ds:schemaRef ds:uri="16c05727-aa75-4e4a-9b5f-8a80a1165891"/>
+    <ds:schemaRef ds:uri="71af3243-3dd4-4a8d-8c0d-dd76da1f02a5"/>
+  </ds:schemaRefs>
+</ds:datastoreItem>
 </file>
 
-<file path=customXml/item3.xml><?xml version="1.0" encoding="utf-8"?>
-<p:properties xmlns:p="http://schemas.microsoft.com/office/2006/metadata/properties" xmlns:xsi="http://www.w3.org/2001/XMLSchema-instance" xmlns:pc="http://schemas.microsoft.com/office/infopath/2007/PartnerControls">
-  <documentManagement>
-    <MediaServiceKeyPoints xmlns="71af3243-3dd4-4a8d-8c0d-dd76da1f02a5" xsi:nil="true"/>
-  </documentManagement>
-</p:properties>
+<file path=customXml/itemProps2.xml><?xml version="1.0" encoding="utf-8"?>
+<ds:datastoreItem xmlns:ds="http://schemas.openxmlformats.org/officeDocument/2006/customXml" ds:itemID="{2F216B87-2324-4AB6-A474-120223C4E2FA}">
+  <ds:schemaRefs>
+    <ds:schemaRef ds:uri="http://schemas.microsoft.com/sharepoint/v3/contenttype/forms"/>
+  </ds:schemaRefs>
+</ds:datastoreItem>
 </file>
 
-<file path=customXml/itemProps1.xml><?xml version="1.0" encoding="utf-8"?>
+<file path=customXml/itemProps3.xml><?xml version="1.0" encoding="utf-8"?>
 <ds:datastoreItem xmlns:ds="http://schemas.openxmlformats.org/officeDocument/2006/customXml" ds:itemID="{4D842F48-1F9A-4BF5-9625-3C9125FB5E40}">
   <ds:schemaRefs>
     <ds:schemaRef ds:uri="http://schemas.microsoft.com/office/2006/metadata/contentType"/>
@@ -13168,29 +13432,4 @@
     <ds:schemaRef ds:uri="http://schemas.microsoft.com/internal/obd"/>
   </ds:schemaRefs>
 </ds:datastoreItem>
-</file>
-
-<file path=customXml/itemProps2.xml><?xml version="1.0" encoding="utf-8"?>
-<ds:datastoreItem xmlns:ds="http://schemas.openxmlformats.org/officeDocument/2006/customXml" ds:itemID="{2F216B87-2324-4AB6-A474-120223C4E2FA}">
-  <ds:schemaRefs>
-    <ds:schemaRef ds:uri="http://schemas.microsoft.com/sharepoint/v3/contenttype/forms"/>
-  </ds:schemaRefs>
-</ds:datastoreItem>
-</file>
-
-<file path=customXml/itemProps3.xml><?xml version="1.0" encoding="utf-8"?>
-<ds:datastoreItem xmlns:ds="http://schemas.openxmlformats.org/officeDocument/2006/customXml" ds:itemID="{1F7A24C6-F6F8-404A-BEA9-F5AB5CC4EFF3}">
-  <ds:schemaRefs>
-    <ds:schemaRef ds:uri="http://schemas.microsoft.com/office/2006/documentManagement/types"/>
-    <ds:schemaRef ds:uri="http://www.w3.org/XML/1998/namespace"/>
-    <ds:schemaRef ds:uri="http://purl.org/dc/dcmitype/"/>
-    <ds:schemaRef ds:uri="http://purl.org/dc/terms/"/>
-    <ds:schemaRef ds:uri="http://schemas.microsoft.com/office/infopath/2007/PartnerControls"/>
-    <ds:schemaRef ds:uri="http://schemas.microsoft.com/office/2006/metadata/properties"/>
-    <ds:schemaRef ds:uri="http://purl.org/dc/elements/1.1/"/>
-    <ds:schemaRef ds:uri="http://schemas.openxmlformats.org/package/2006/metadata/core-properties"/>
-    <ds:schemaRef ds:uri="16c05727-aa75-4e4a-9b5f-8a80a1165891"/>
-    <ds:schemaRef ds:uri="71af3243-3dd4-4a8d-8c0d-dd76da1f02a5"/>
-  </ds:schemaRefs>
-</ds:datastoreItem>
 </file>
</xml_diff>